<commit_message>
changed some pics on slides
</commit_message>
<xml_diff>
--- a/algorithms.pptx
+++ b/algorithms.pptx
@@ -205,7 +205,7 @@
           <a:p>
             <a:fld id="{D13A1812-397A-8948-8479-D167042776FE}" type="datetimeFigureOut">
               <a:rPr lang="en-US" smtClean="0"/>
-              <a:t>7/10/14</a:t>
+              <a:t>8/16/14</a:t>
             </a:fld>
             <a:endParaRPr lang="en-US"/>
           </a:p>
@@ -838,7 +838,7 @@
           <a:p>
             <a:fld id="{142E195F-C31E-6F42-B57B-0E1FCA3B0BCB}" type="datetimeFigureOut">
               <a:rPr lang="en-US" smtClean="0"/>
-              <a:t>7/10/14</a:t>
+              <a:t>8/16/14</a:t>
             </a:fld>
             <a:endParaRPr lang="en-US"/>
           </a:p>
@@ -1008,7 +1008,7 @@
           <a:p>
             <a:fld id="{142E195F-C31E-6F42-B57B-0E1FCA3B0BCB}" type="datetimeFigureOut">
               <a:rPr lang="en-US" smtClean="0"/>
-              <a:t>7/10/14</a:t>
+              <a:t>8/16/14</a:t>
             </a:fld>
             <a:endParaRPr lang="en-US"/>
           </a:p>
@@ -1188,7 +1188,7 @@
           <a:p>
             <a:fld id="{142E195F-C31E-6F42-B57B-0E1FCA3B0BCB}" type="datetimeFigureOut">
               <a:rPr lang="en-US" smtClean="0"/>
-              <a:t>7/10/14</a:t>
+              <a:t>8/16/14</a:t>
             </a:fld>
             <a:endParaRPr lang="en-US"/>
           </a:p>
@@ -1358,7 +1358,7 @@
           <a:p>
             <a:fld id="{142E195F-C31E-6F42-B57B-0E1FCA3B0BCB}" type="datetimeFigureOut">
               <a:rPr lang="en-US" smtClean="0"/>
-              <a:t>7/10/14</a:t>
+              <a:t>8/16/14</a:t>
             </a:fld>
             <a:endParaRPr lang="en-US"/>
           </a:p>
@@ -1604,7 +1604,7 @@
           <a:p>
             <a:fld id="{142E195F-C31E-6F42-B57B-0E1FCA3B0BCB}" type="datetimeFigureOut">
               <a:rPr lang="en-US" smtClean="0"/>
-              <a:t>7/10/14</a:t>
+              <a:t>8/16/14</a:t>
             </a:fld>
             <a:endParaRPr lang="en-US"/>
           </a:p>
@@ -1892,7 +1892,7 @@
           <a:p>
             <a:fld id="{142E195F-C31E-6F42-B57B-0E1FCA3B0BCB}" type="datetimeFigureOut">
               <a:rPr lang="en-US" smtClean="0"/>
-              <a:t>7/10/14</a:t>
+              <a:t>8/16/14</a:t>
             </a:fld>
             <a:endParaRPr lang="en-US"/>
           </a:p>
@@ -2314,7 +2314,7 @@
           <a:p>
             <a:fld id="{142E195F-C31E-6F42-B57B-0E1FCA3B0BCB}" type="datetimeFigureOut">
               <a:rPr lang="en-US" smtClean="0"/>
-              <a:t>7/10/14</a:t>
+              <a:t>8/16/14</a:t>
             </a:fld>
             <a:endParaRPr lang="en-US"/>
           </a:p>
@@ -2432,7 +2432,7 @@
           <a:p>
             <a:fld id="{142E195F-C31E-6F42-B57B-0E1FCA3B0BCB}" type="datetimeFigureOut">
               <a:rPr lang="en-US" smtClean="0"/>
-              <a:t>7/10/14</a:t>
+              <a:t>8/16/14</a:t>
             </a:fld>
             <a:endParaRPr lang="en-US"/>
           </a:p>
@@ -2527,7 +2527,7 @@
           <a:p>
             <a:fld id="{142E195F-C31E-6F42-B57B-0E1FCA3B0BCB}" type="datetimeFigureOut">
               <a:rPr lang="en-US" smtClean="0"/>
-              <a:t>7/10/14</a:t>
+              <a:t>8/16/14</a:t>
             </a:fld>
             <a:endParaRPr lang="en-US"/>
           </a:p>
@@ -2804,7 +2804,7 @@
           <a:p>
             <a:fld id="{142E195F-C31E-6F42-B57B-0E1FCA3B0BCB}" type="datetimeFigureOut">
               <a:rPr lang="en-US" smtClean="0"/>
-              <a:t>7/10/14</a:t>
+              <a:t>8/16/14</a:t>
             </a:fld>
             <a:endParaRPr lang="en-US"/>
           </a:p>
@@ -3057,7 +3057,7 @@
           <a:p>
             <a:fld id="{142E195F-C31E-6F42-B57B-0E1FCA3B0BCB}" type="datetimeFigureOut">
               <a:rPr lang="en-US" smtClean="0"/>
-              <a:t>7/10/14</a:t>
+              <a:t>8/16/14</a:t>
             </a:fld>
             <a:endParaRPr lang="en-US"/>
           </a:p>
@@ -3270,7 +3270,7 @@
           <a:p>
             <a:fld id="{142E195F-C31E-6F42-B57B-0E1FCA3B0BCB}" type="datetimeFigureOut">
               <a:rPr lang="en-US" smtClean="0"/>
-              <a:t>7/10/14</a:t>
+              <a:t>8/16/14</a:t>
             </a:fld>
             <a:endParaRPr lang="en-US"/>
           </a:p>
@@ -5158,30 +5158,6 @@
           </a:p>
         </p:txBody>
       </p:sp>
-      <p:pic>
-        <p:nvPicPr>
-          <p:cNvPr id="4" name="Picture 3"/>
-          <p:cNvPicPr>
-            <a:picLocks noChangeAspect="1"/>
-          </p:cNvPicPr>
-          <p:nvPr/>
-        </p:nvPicPr>
-        <p:blipFill>
-          <a:blip r:embed="rId2"/>
-          <a:stretch>
-            <a:fillRect/>
-          </a:stretch>
-        </p:blipFill>
-        <p:spPr>
-          <a:xfrm>
-            <a:off x="2556476" y="4050844"/>
-            <a:ext cx="4284959" cy="2507755"/>
-          </a:xfrm>
-          <a:prstGeom prst="rect">
-            <a:avLst/>
-          </a:prstGeom>
-        </p:spPr>
-      </p:pic>
     </p:spTree>
     <p:extLst>
       <p:ext uri="{BB962C8B-B14F-4D97-AF65-F5344CB8AC3E}">

</xml_diff>